<commit_message>
changed some small bits, mainly grammar
</commit_message>
<xml_diff>
--- a/documents/presentation_assignment1.pptx
+++ b/documents/presentation_assignment1.pptx
@@ -144,7 +144,7 @@
   </p:defaultTextStyle>
   <p:extLst>
     <p:ext uri="{EFAFB233-063F-42B5-8137-9DF3F51BA10A}">
-      <p15:sldGuideLst xmlns:p15="http://schemas.microsoft.com/office/powerpoint/2012/main">
+      <p15:sldGuideLst xmlns="" xmlns:p15="http://schemas.microsoft.com/office/powerpoint/2012/main">
         <p15:guide id="1" orient="horz" pos="1419" userDrawn="1">
           <p15:clr>
             <a:srgbClr val="A4A3A4"/>
@@ -274,15 +274,15 @@
           </a:ln>
           <a:effectLst/>
           <a:extLst>
-            <a:ext uri="{909E8E84-426E-40dd-AFC4-6F175D3DCCD1}">
-              <a14:hiddenFill xmlns="" xmlns:a14="http://schemas.microsoft.com/office/drawing/2010/main">
+            <a:ext uri="{909E8E84-426E-40DD-AFC4-6F175D3DCCD1}">
+              <a14:hiddenFill xmlns:a14="http://schemas.microsoft.com/office/drawing/2010/main">
                 <a:solidFill>
                   <a:schemeClr val="accent1"/>
                 </a:solidFill>
               </a14:hiddenFill>
             </a:ext>
-            <a:ext uri="{91240B29-F687-4f45-9708-019B960494DF}">
-              <a14:hiddenLine xmlns="" xmlns:a14="http://schemas.microsoft.com/office/drawing/2010/main" w="9525">
+            <a:ext uri="{91240B29-F687-4F45-9708-019B960494DF}">
+              <a14:hiddenLine xmlns:a14="http://schemas.microsoft.com/office/drawing/2010/main" w="9525">
                 <a:solidFill>
                   <a:schemeClr val="tx1"/>
                 </a:solidFill>
@@ -291,8 +291,8 @@
                 <a:tailEnd/>
               </a14:hiddenLine>
             </a:ext>
-            <a:ext uri="{AF507438-7753-43e0-B8FC-AC1667EBCBE1}">
-              <a14:hiddenEffects xmlns="" xmlns:a14="http://schemas.microsoft.com/office/drawing/2010/main">
+            <a:ext uri="{AF507438-7753-43E0-B8FC-AC1667EBCBE1}">
+              <a14:hiddenEffects xmlns:a14="http://schemas.microsoft.com/office/drawing/2010/main">
                 <a:effectLst>
                   <a:outerShdw blurRad="63500" dist="38099" dir="2700000" algn="ctr" rotWithShape="0">
                     <a:schemeClr val="bg2">
@@ -347,15 +347,15 @@
           </a:ln>
           <a:effectLst/>
           <a:extLst>
-            <a:ext uri="{909E8E84-426E-40dd-AFC4-6F175D3DCCD1}">
-              <a14:hiddenFill xmlns="" xmlns:a14="http://schemas.microsoft.com/office/drawing/2010/main">
+            <a:ext uri="{909E8E84-426E-40DD-AFC4-6F175D3DCCD1}">
+              <a14:hiddenFill xmlns:a14="http://schemas.microsoft.com/office/drawing/2010/main">
                 <a:solidFill>
                   <a:schemeClr val="accent1"/>
                 </a:solidFill>
               </a14:hiddenFill>
             </a:ext>
-            <a:ext uri="{91240B29-F687-4f45-9708-019B960494DF}">
-              <a14:hiddenLine xmlns="" xmlns:a14="http://schemas.microsoft.com/office/drawing/2010/main" w="9525">
+            <a:ext uri="{91240B29-F687-4F45-9708-019B960494DF}">
+              <a14:hiddenLine xmlns:a14="http://schemas.microsoft.com/office/drawing/2010/main" w="9525">
                 <a:solidFill>
                   <a:schemeClr val="tx1"/>
                 </a:solidFill>
@@ -364,8 +364,8 @@
                 <a:tailEnd/>
               </a14:hiddenLine>
             </a:ext>
-            <a:ext uri="{AF507438-7753-43e0-B8FC-AC1667EBCBE1}">
-              <a14:hiddenEffects xmlns="" xmlns:a14="http://schemas.microsoft.com/office/drawing/2010/main">
+            <a:ext uri="{AF507438-7753-43E0-B8FC-AC1667EBCBE1}">
+              <a14:hiddenEffects xmlns:a14="http://schemas.microsoft.com/office/drawing/2010/main">
                 <a:effectLst>
                   <a:outerShdw blurRad="63500" dist="38099" dir="2700000" algn="ctr" rotWithShape="0">
                     <a:schemeClr val="bg2">
@@ -425,8 +425,8 @@
           </a:ln>
           <a:effectLst/>
           <a:extLst>
-            <a:ext uri="{AF507438-7753-43e0-B8FC-AC1667EBCBE1}">
-              <a14:hiddenEffects xmlns="" xmlns:a14="http://schemas.microsoft.com/office/drawing/2010/main">
+            <a:ext uri="{AF507438-7753-43E0-B8FC-AC1667EBCBE1}">
+              <a14:hiddenEffects xmlns:a14="http://schemas.microsoft.com/office/drawing/2010/main">
                 <a:effectLst>
                   <a:outerShdw blurRad="63500" dist="38099" dir="2700000" algn="ctr" rotWithShape="0">
                     <a:srgbClr val="000000">
@@ -436,8 +436,8 @@
                 </a:effectLst>
               </a14:hiddenEffects>
             </a:ext>
-            <a:ext uri="{53640926-AAD7-44d8-BBD7-CCE9431645EC}">
-              <a14:shadowObscured xmlns="" xmlns:a14="http://schemas.microsoft.com/office/drawing/2010/main" val="1"/>
+            <a:ext uri="{53640926-AAD7-44D8-BBD7-CCE9431645EC}">
+              <a14:shadowObscured xmlns:a14="http://schemas.microsoft.com/office/drawing/2010/main" val="1"/>
             </a:ext>
           </a:extLst>
         </p:spPr>
@@ -466,15 +466,15 @@
           </a:ln>
           <a:effectLst/>
           <a:extLst>
-            <a:ext uri="{909E8E84-426E-40dd-AFC4-6F175D3DCCD1}">
-              <a14:hiddenFill xmlns="" xmlns:a14="http://schemas.microsoft.com/office/drawing/2010/main">
+            <a:ext uri="{909E8E84-426E-40DD-AFC4-6F175D3DCCD1}">
+              <a14:hiddenFill xmlns:a14="http://schemas.microsoft.com/office/drawing/2010/main">
                 <a:solidFill>
                   <a:schemeClr val="accent1"/>
                 </a:solidFill>
               </a14:hiddenFill>
             </a:ext>
-            <a:ext uri="{91240B29-F687-4f45-9708-019B960494DF}">
-              <a14:hiddenLine xmlns="" xmlns:a14="http://schemas.microsoft.com/office/drawing/2010/main" w="9525">
+            <a:ext uri="{91240B29-F687-4F45-9708-019B960494DF}">
+              <a14:hiddenLine xmlns:a14="http://schemas.microsoft.com/office/drawing/2010/main" w="9525">
                 <a:solidFill>
                   <a:schemeClr val="tx1"/>
                 </a:solidFill>
@@ -483,8 +483,8 @@
                 <a:tailEnd/>
               </a14:hiddenLine>
             </a:ext>
-            <a:ext uri="{AF507438-7753-43e0-B8FC-AC1667EBCBE1}">
-              <a14:hiddenEffects xmlns="" xmlns:a14="http://schemas.microsoft.com/office/drawing/2010/main">
+            <a:ext uri="{AF507438-7753-43E0-B8FC-AC1667EBCBE1}">
+              <a14:hiddenEffects xmlns:a14="http://schemas.microsoft.com/office/drawing/2010/main">
                 <a:effectLst>
                   <a:outerShdw blurRad="63500" dist="38099" dir="2700000" algn="ctr" rotWithShape="0">
                     <a:schemeClr val="bg2">
@@ -567,15 +567,15 @@
           </a:ln>
           <a:effectLst/>
           <a:extLst>
-            <a:ext uri="{909E8E84-426E-40dd-AFC4-6F175D3DCCD1}">
-              <a14:hiddenFill xmlns="" xmlns:a14="http://schemas.microsoft.com/office/drawing/2010/main">
+            <a:ext uri="{909E8E84-426E-40DD-AFC4-6F175D3DCCD1}">
+              <a14:hiddenFill xmlns:a14="http://schemas.microsoft.com/office/drawing/2010/main">
                 <a:solidFill>
                   <a:schemeClr val="accent1"/>
                 </a:solidFill>
               </a14:hiddenFill>
             </a:ext>
-            <a:ext uri="{91240B29-F687-4f45-9708-019B960494DF}">
-              <a14:hiddenLine xmlns="" xmlns:a14="http://schemas.microsoft.com/office/drawing/2010/main" w="9525">
+            <a:ext uri="{91240B29-F687-4F45-9708-019B960494DF}">
+              <a14:hiddenLine xmlns:a14="http://schemas.microsoft.com/office/drawing/2010/main" w="9525">
                 <a:solidFill>
                   <a:schemeClr val="tx1"/>
                 </a:solidFill>
@@ -584,8 +584,8 @@
                 <a:tailEnd/>
               </a14:hiddenLine>
             </a:ext>
-            <a:ext uri="{AF507438-7753-43e0-B8FC-AC1667EBCBE1}">
-              <a14:hiddenEffects xmlns="" xmlns:a14="http://schemas.microsoft.com/office/drawing/2010/main">
+            <a:ext uri="{AF507438-7753-43E0-B8FC-AC1667EBCBE1}">
+              <a14:hiddenEffects xmlns:a14="http://schemas.microsoft.com/office/drawing/2010/main">
                 <a:effectLst>
                   <a:outerShdw blurRad="63500" dist="38099" dir="2700000" algn="ctr" rotWithShape="0">
                     <a:schemeClr val="bg2">
@@ -640,15 +640,15 @@
           </a:ln>
           <a:effectLst/>
           <a:extLst>
-            <a:ext uri="{909E8E84-426E-40dd-AFC4-6F175D3DCCD1}">
-              <a14:hiddenFill xmlns="" xmlns:a14="http://schemas.microsoft.com/office/drawing/2010/main">
+            <a:ext uri="{909E8E84-426E-40DD-AFC4-6F175D3DCCD1}">
+              <a14:hiddenFill xmlns:a14="http://schemas.microsoft.com/office/drawing/2010/main">
                 <a:solidFill>
                   <a:schemeClr val="accent1"/>
                 </a:solidFill>
               </a14:hiddenFill>
             </a:ext>
-            <a:ext uri="{91240B29-F687-4f45-9708-019B960494DF}">
-              <a14:hiddenLine xmlns="" xmlns:a14="http://schemas.microsoft.com/office/drawing/2010/main" w="9525">
+            <a:ext uri="{91240B29-F687-4F45-9708-019B960494DF}">
+              <a14:hiddenLine xmlns:a14="http://schemas.microsoft.com/office/drawing/2010/main" w="9525">
                 <a:solidFill>
                   <a:schemeClr val="tx1"/>
                 </a:solidFill>
@@ -657,8 +657,8 @@
                 <a:tailEnd/>
               </a14:hiddenLine>
             </a:ext>
-            <a:ext uri="{AF507438-7753-43e0-B8FC-AC1667EBCBE1}">
-              <a14:hiddenEffects xmlns="" xmlns:a14="http://schemas.microsoft.com/office/drawing/2010/main">
+            <a:ext uri="{AF507438-7753-43E0-B8FC-AC1667EBCBE1}">
+              <a14:hiddenEffects xmlns:a14="http://schemas.microsoft.com/office/drawing/2010/main">
                 <a:effectLst>
                   <a:outerShdw blurRad="63500" dist="38099" dir="2700000" algn="ctr" rotWithShape="0">
                     <a:schemeClr val="bg2">
@@ -688,7 +688,7 @@
             <a:fld id="{54E7F490-E965-9B42-AE49-DA4BC6E663B1}" type="slidenum">
               <a:rPr lang="de-CH"/>
               <a:pPr/>
-              <a:t>‹Nr.›</a:t>
+              <a:t>‹#›</a:t>
             </a:fld>
             <a:endParaRPr lang="de-CH"/>
           </a:p>
@@ -999,7 +999,7 @@
             <a:fld id="{9D46F3A4-F478-9440-BC8E-B732027F4C86}" type="slidenum">
               <a:rPr lang="en-US" smtClean="0"/>
               <a:pPr/>
-              <a:t>‹Nr.›</a:t>
+              <a:t>‹#›</a:t>
             </a:fld>
             <a:endParaRPr lang="en-US" dirty="0"/>
           </a:p>
@@ -1012,7 +1012,7 @@
   </p:clrMapOvr>
   <p:extLst mod="1">
     <p:ext uri="{DCECCB84-F9BA-43D5-87BE-67443E8EF086}">
-      <p15:sldGuideLst xmlns:p15="http://schemas.microsoft.com/office/powerpoint/2012/main">
+      <p15:sldGuideLst xmlns="" xmlns:p15="http://schemas.microsoft.com/office/powerpoint/2012/main">
         <p15:guide id="1" orient="horz" pos="1253" userDrawn="1">
           <p15:clr>
             <a:srgbClr val="9FCC3B"/>
@@ -1072,8 +1072,8 @@
           </a:ln>
           <a:effectLst/>
           <a:extLst>
-            <a:ext uri="{AF507438-7753-43e0-B8FC-AC1667EBCBE1}">
-              <a14:hiddenEffects xmlns="" xmlns:a14="http://schemas.microsoft.com/office/drawing/2010/main">
+            <a:ext uri="{AF507438-7753-43E0-B8FC-AC1667EBCBE1}">
+              <a14:hiddenEffects xmlns:a14="http://schemas.microsoft.com/office/drawing/2010/main">
                 <a:effectLst>
                   <a:outerShdw blurRad="63500" dist="35921" dir="2700000" algn="ctr" rotWithShape="0">
                     <a:schemeClr val="bg2"/>
@@ -1327,7 +1327,7 @@
             <a:fld id="{9D46F3A4-F478-9440-BC8E-B732027F4C86}" type="slidenum">
               <a:rPr lang="en-US" smtClean="0"/>
               <a:pPr/>
-              <a:t>‹Nr.›</a:t>
+              <a:t>‹#›</a:t>
             </a:fld>
             <a:endParaRPr lang="en-US" dirty="0"/>
           </a:p>
@@ -1568,7 +1568,7 @@
             <a:fld id="{9D46F3A4-F478-9440-BC8E-B732027F4C86}" type="slidenum">
               <a:rPr lang="en-US" smtClean="0"/>
               <a:pPr/>
-              <a:t>‹Nr.›</a:t>
+              <a:t>‹#›</a:t>
             </a:fld>
             <a:endParaRPr lang="en-US" dirty="0"/>
           </a:p>
@@ -1695,7 +1695,7 @@
             <a:fld id="{9D46F3A4-F478-9440-BC8E-B732027F4C86}" type="slidenum">
               <a:rPr lang="en-US" smtClean="0"/>
               <a:pPr/>
-              <a:t>‹Nr.›</a:t>
+              <a:t>‹#›</a:t>
             </a:fld>
             <a:endParaRPr lang="en-US" dirty="0"/>
           </a:p>
@@ -1771,7 +1771,7 @@
   </p:clrMapOvr>
   <p:extLst mod="1">
     <p:ext uri="{DCECCB84-F9BA-43D5-87BE-67443E8EF086}">
-      <p15:sldGuideLst xmlns:p15="http://schemas.microsoft.com/office/powerpoint/2012/main">
+      <p15:sldGuideLst xmlns="" xmlns:p15="http://schemas.microsoft.com/office/powerpoint/2012/main">
         <p15:guide id="1" pos="121" userDrawn="1">
           <p15:clr>
             <a:srgbClr val="9FCC3B"/>
@@ -1883,7 +1883,7 @@
             <a:fld id="{9D46F3A4-F478-9440-BC8E-B732027F4C86}" type="slidenum">
               <a:rPr lang="en-US" smtClean="0"/>
               <a:pPr/>
-              <a:t>‹Nr.›</a:t>
+              <a:t>‹#›</a:t>
             </a:fld>
             <a:endParaRPr lang="en-US" dirty="0"/>
           </a:p>
@@ -1958,8 +1958,8 @@
           </a:prstGeom>
           <a:noFill/>
           <a:extLst>
-            <a:ext uri="{909E8E84-426E-40dd-AFC4-6F175D3DCCD1}">
-              <a14:hiddenFill xmlns="" xmlns:a14="http://schemas.microsoft.com/office/drawing/2010/main">
+            <a:ext uri="{909E8E84-426E-40DD-AFC4-6F175D3DCCD1}">
+              <a14:hiddenFill xmlns:a14="http://schemas.microsoft.com/office/drawing/2010/main">
                 <a:solidFill>
                   <a:srgbClr val="FFFFFF"/>
                 </a:solidFill>
@@ -1992,15 +1992,15 @@
           </a:ln>
           <a:effectLst/>
           <a:extLst>
-            <a:ext uri="{909E8E84-426E-40dd-AFC4-6F175D3DCCD1}">
-              <a14:hiddenFill xmlns="" xmlns:a14="http://schemas.microsoft.com/office/drawing/2010/main">
+            <a:ext uri="{909E8E84-426E-40DD-AFC4-6F175D3DCCD1}">
+              <a14:hiddenFill xmlns:a14="http://schemas.microsoft.com/office/drawing/2010/main">
                 <a:solidFill>
                   <a:schemeClr val="accent1"/>
                 </a:solidFill>
               </a14:hiddenFill>
             </a:ext>
-            <a:ext uri="{91240B29-F687-4f45-9708-019B960494DF}">
-              <a14:hiddenLine xmlns="" xmlns:a14="http://schemas.microsoft.com/office/drawing/2010/main" w="9525">
+            <a:ext uri="{91240B29-F687-4F45-9708-019B960494DF}">
+              <a14:hiddenLine xmlns:a14="http://schemas.microsoft.com/office/drawing/2010/main" w="9525">
                 <a:solidFill>
                   <a:schemeClr val="tx1"/>
                 </a:solidFill>
@@ -2009,8 +2009,8 @@
                 <a:tailEnd/>
               </a14:hiddenLine>
             </a:ext>
-            <a:ext uri="{AF507438-7753-43e0-B8FC-AC1667EBCBE1}">
-              <a14:hiddenEffects xmlns="" xmlns:a14="http://schemas.microsoft.com/office/drawing/2010/main">
+            <a:ext uri="{AF507438-7753-43E0-B8FC-AC1667EBCBE1}">
+              <a14:hiddenEffects xmlns:a14="http://schemas.microsoft.com/office/drawing/2010/main">
                 <a:effectLst>
                   <a:outerShdw blurRad="63500" dist="38099" dir="2700000" algn="ctr" rotWithShape="0">
                     <a:schemeClr val="bg2">
@@ -2074,15 +2074,15 @@
           </a:ln>
           <a:effectLst/>
           <a:extLst>
-            <a:ext uri="{909E8E84-426E-40dd-AFC4-6F175D3DCCD1}">
-              <a14:hiddenFill xmlns="" xmlns:a14="http://schemas.microsoft.com/office/drawing/2010/main">
+            <a:ext uri="{909E8E84-426E-40DD-AFC4-6F175D3DCCD1}">
+              <a14:hiddenFill xmlns:a14="http://schemas.microsoft.com/office/drawing/2010/main">
                 <a:solidFill>
                   <a:schemeClr val="accent1"/>
                 </a:solidFill>
               </a14:hiddenFill>
             </a:ext>
-            <a:ext uri="{91240B29-F687-4f45-9708-019B960494DF}">
-              <a14:hiddenLine xmlns="" xmlns:a14="http://schemas.microsoft.com/office/drawing/2010/main" w="9525">
+            <a:ext uri="{91240B29-F687-4F45-9708-019B960494DF}">
+              <a14:hiddenLine xmlns:a14="http://schemas.microsoft.com/office/drawing/2010/main" w="9525">
                 <a:solidFill>
                   <a:schemeClr val="tx1"/>
                 </a:solidFill>
@@ -2091,8 +2091,8 @@
                 <a:tailEnd/>
               </a14:hiddenLine>
             </a:ext>
-            <a:ext uri="{AF507438-7753-43e0-B8FC-AC1667EBCBE1}">
-              <a14:hiddenEffects xmlns="" xmlns:a14="http://schemas.microsoft.com/office/drawing/2010/main">
+            <a:ext uri="{AF507438-7753-43E0-B8FC-AC1667EBCBE1}">
+              <a14:hiddenEffects xmlns:a14="http://schemas.microsoft.com/office/drawing/2010/main">
                 <a:effectLst>
                   <a:outerShdw blurRad="63500" dist="38099" dir="2700000" algn="ctr" rotWithShape="0">
                     <a:schemeClr val="bg2">
@@ -2220,15 +2220,15 @@
           </a:ln>
           <a:effectLst/>
           <a:extLst>
-            <a:ext uri="{909E8E84-426E-40dd-AFC4-6F175D3DCCD1}">
-              <a14:hiddenFill xmlns="" xmlns:a14="http://schemas.microsoft.com/office/drawing/2010/main">
+            <a:ext uri="{909E8E84-426E-40DD-AFC4-6F175D3DCCD1}">
+              <a14:hiddenFill xmlns:a14="http://schemas.microsoft.com/office/drawing/2010/main">
                 <a:solidFill>
                   <a:schemeClr val="accent1"/>
                 </a:solidFill>
               </a14:hiddenFill>
             </a:ext>
-            <a:ext uri="{91240B29-F687-4f45-9708-019B960494DF}">
-              <a14:hiddenLine xmlns="" xmlns:a14="http://schemas.microsoft.com/office/drawing/2010/main" w="9525">
+            <a:ext uri="{91240B29-F687-4F45-9708-019B960494DF}">
+              <a14:hiddenLine xmlns:a14="http://schemas.microsoft.com/office/drawing/2010/main" w="9525">
                 <a:solidFill>
                   <a:schemeClr val="tx1"/>
                 </a:solidFill>
@@ -2237,8 +2237,8 @@
                 <a:tailEnd/>
               </a14:hiddenLine>
             </a:ext>
-            <a:ext uri="{AF507438-7753-43e0-B8FC-AC1667EBCBE1}">
-              <a14:hiddenEffects xmlns="" xmlns:a14="http://schemas.microsoft.com/office/drawing/2010/main">
+            <a:ext uri="{AF507438-7753-43E0-B8FC-AC1667EBCBE1}">
+              <a14:hiddenEffects xmlns:a14="http://schemas.microsoft.com/office/drawing/2010/main">
                 <a:effectLst>
                   <a:outerShdw blurRad="63500" dist="38099" dir="2700000" algn="ctr" rotWithShape="0">
                     <a:schemeClr val="bg2">
@@ -2297,15 +2297,15 @@
           </a:ln>
           <a:effectLst/>
           <a:extLst>
-            <a:ext uri="{909E8E84-426E-40dd-AFC4-6F175D3DCCD1}">
-              <a14:hiddenFill xmlns="" xmlns:a14="http://schemas.microsoft.com/office/drawing/2010/main">
+            <a:ext uri="{909E8E84-426E-40DD-AFC4-6F175D3DCCD1}">
+              <a14:hiddenFill xmlns:a14="http://schemas.microsoft.com/office/drawing/2010/main">
                 <a:solidFill>
                   <a:schemeClr val="accent1"/>
                 </a:solidFill>
               </a14:hiddenFill>
             </a:ext>
-            <a:ext uri="{91240B29-F687-4f45-9708-019B960494DF}">
-              <a14:hiddenLine xmlns="" xmlns:a14="http://schemas.microsoft.com/office/drawing/2010/main" w="9525">
+            <a:ext uri="{91240B29-F687-4F45-9708-019B960494DF}">
+              <a14:hiddenLine xmlns:a14="http://schemas.microsoft.com/office/drawing/2010/main" w="9525">
                 <a:solidFill>
                   <a:schemeClr val="tx1"/>
                 </a:solidFill>
@@ -2314,8 +2314,8 @@
                 <a:tailEnd/>
               </a14:hiddenLine>
             </a:ext>
-            <a:ext uri="{AF507438-7753-43e0-B8FC-AC1667EBCBE1}">
-              <a14:hiddenEffects xmlns="" xmlns:a14="http://schemas.microsoft.com/office/drawing/2010/main">
+            <a:ext uri="{AF507438-7753-43E0-B8FC-AC1667EBCBE1}">
+              <a14:hiddenEffects xmlns:a14="http://schemas.microsoft.com/office/drawing/2010/main">
                 <a:effectLst>
                   <a:outerShdw blurRad="63500" dist="38099" dir="2700000" algn="ctr" rotWithShape="0">
                     <a:schemeClr val="bg2">
@@ -2394,15 +2394,15 @@
           </a:ln>
           <a:effectLst/>
           <a:extLst>
-            <a:ext uri="{909E8E84-426E-40dd-AFC4-6F175D3DCCD1}">
-              <a14:hiddenFill xmlns="" xmlns:a14="http://schemas.microsoft.com/office/drawing/2010/main">
+            <a:ext uri="{909E8E84-426E-40DD-AFC4-6F175D3DCCD1}">
+              <a14:hiddenFill xmlns:a14="http://schemas.microsoft.com/office/drawing/2010/main">
                 <a:solidFill>
                   <a:schemeClr val="accent1"/>
                 </a:solidFill>
               </a14:hiddenFill>
             </a:ext>
-            <a:ext uri="{91240B29-F687-4f45-9708-019B960494DF}">
-              <a14:hiddenLine xmlns="" xmlns:a14="http://schemas.microsoft.com/office/drawing/2010/main" w="9525">
+            <a:ext uri="{91240B29-F687-4F45-9708-019B960494DF}">
+              <a14:hiddenLine xmlns:a14="http://schemas.microsoft.com/office/drawing/2010/main" w="9525">
                 <a:solidFill>
                   <a:schemeClr val="tx1"/>
                 </a:solidFill>
@@ -2411,8 +2411,8 @@
                 <a:tailEnd/>
               </a14:hiddenLine>
             </a:ext>
-            <a:ext uri="{AF507438-7753-43e0-B8FC-AC1667EBCBE1}">
-              <a14:hiddenEffects xmlns="" xmlns:a14="http://schemas.microsoft.com/office/drawing/2010/main">
+            <a:ext uri="{AF507438-7753-43E0-B8FC-AC1667EBCBE1}">
+              <a14:hiddenEffects xmlns:a14="http://schemas.microsoft.com/office/drawing/2010/main">
                 <a:effectLst>
                   <a:outerShdw blurRad="63500" dist="38099" dir="2700000" algn="ctr" rotWithShape="0">
                     <a:schemeClr val="bg2">
@@ -2446,7 +2446,7 @@
             <a:fld id="{9D46F3A4-F478-9440-BC8E-B732027F4C86}" type="slidenum">
               <a:rPr lang="en-US" smtClean="0"/>
               <a:pPr/>
-              <a:t>‹Nr.›</a:t>
+              <a:t>‹#›</a:t>
             </a:fld>
             <a:endParaRPr lang="en-US" dirty="0"/>
           </a:p>
@@ -2479,13 +2479,13 @@
           </a:ln>
           <a:effectLst/>
           <a:extLst>
-            <a:ext uri="{909E8E84-426E-40dd-AFC4-6F175D3DCCD1}">
-              <a14:hiddenFill xmlns="" xmlns:a14="http://schemas.microsoft.com/office/drawing/2010/main">
+            <a:ext uri="{909E8E84-426E-40DD-AFC4-6F175D3DCCD1}">
+              <a14:hiddenFill xmlns:a14="http://schemas.microsoft.com/office/drawing/2010/main">
                 <a:noFill/>
               </a14:hiddenFill>
             </a:ext>
-            <a:ext uri="{AF507438-7753-43e0-B8FC-AC1667EBCBE1}">
-              <a14:hiddenEffects xmlns="" xmlns:a14="http://schemas.microsoft.com/office/drawing/2010/main">
+            <a:ext uri="{AF507438-7753-43E0-B8FC-AC1667EBCBE1}">
+              <a14:hiddenEffects xmlns:a14="http://schemas.microsoft.com/office/drawing/2010/main">
                 <a:effectLst>
                   <a:outerShdw blurRad="63500" dist="38099" dir="2700000" algn="ctr" rotWithShape="0">
                     <a:schemeClr val="bg2">
@@ -2527,15 +2527,15 @@
           </a:ln>
           <a:effectLst/>
           <a:extLst>
-            <a:ext uri="{909E8E84-426E-40dd-AFC4-6F175D3DCCD1}">
-              <a14:hiddenFill xmlns="" xmlns:a14="http://schemas.microsoft.com/office/drawing/2010/main">
+            <a:ext uri="{909E8E84-426E-40DD-AFC4-6F175D3DCCD1}">
+              <a14:hiddenFill xmlns:a14="http://schemas.microsoft.com/office/drawing/2010/main">
                 <a:solidFill>
                   <a:schemeClr val="accent1"/>
                 </a:solidFill>
               </a14:hiddenFill>
             </a:ext>
-            <a:ext uri="{91240B29-F687-4f45-9708-019B960494DF}">
-              <a14:hiddenLine xmlns="" xmlns:a14="http://schemas.microsoft.com/office/drawing/2010/main" w="9525">
+            <a:ext uri="{91240B29-F687-4F45-9708-019B960494DF}">
+              <a14:hiddenLine xmlns:a14="http://schemas.microsoft.com/office/drawing/2010/main" w="9525">
                 <a:solidFill>
                   <a:schemeClr val="tx1"/>
                 </a:solidFill>
@@ -2544,8 +2544,8 @@
                 <a:tailEnd/>
               </a14:hiddenLine>
             </a:ext>
-            <a:ext uri="{AF507438-7753-43e0-B8FC-AC1667EBCBE1}">
-              <a14:hiddenEffects xmlns="" xmlns:a14="http://schemas.microsoft.com/office/drawing/2010/main">
+            <a:ext uri="{AF507438-7753-43E0-B8FC-AC1667EBCBE1}">
+              <a14:hiddenEffects xmlns:a14="http://schemas.microsoft.com/office/drawing/2010/main">
                 <a:effectLst>
                   <a:outerShdw blurRad="63500" dist="38099" dir="2700000" algn="ctr" rotWithShape="0">
                     <a:schemeClr val="bg2">
@@ -2995,7 +2995,7 @@
   </p:txStyles>
   <p:extLst mod="1">
     <p:ext uri="{27BBF7A9-308A-43DC-89C8-2F10F3537804}">
-      <p15:sldGuideLst xmlns:p15="http://schemas.microsoft.com/office/powerpoint/2012/main">
+      <p15:sldGuideLst xmlns="" xmlns:p15="http://schemas.microsoft.com/office/powerpoint/2012/main">
         <p15:guide id="1" pos="574" userDrawn="1">
           <p15:clr>
             <a:srgbClr val="F26B43"/>
@@ -3127,8 +3127,12 @@
           <a:lstStyle/>
           <a:p>
             <a:r>
+              <a:rPr lang="en-US" dirty="0" smtClean="0"/>
+              <a:t>Presentation of Assignment </a:t>
+            </a:r>
+            <a:r>
               <a:rPr lang="en-US" dirty="0"/>
-              <a:t>Assignment 1 </a:t>
+              <a:t>1 </a:t>
             </a:r>
           </a:p>
           <a:p>
@@ -3368,40 +3372,12 @@
               <a:buChar char="§"/>
             </a:pPr>
             <a:r>
+              <a:rPr lang="de-CH" dirty="0" smtClean="0"/>
+              <a:t>Both </a:t>
+            </a:r>
+            <a:r>
               <a:rPr lang="de-CH" dirty="0"/>
-              <a:t>Both, HTML (high </a:t>
-            </a:r>
-            <a:r>
-              <a:rPr lang="de-CH" dirty="0" err="1"/>
-              <a:t>priority</a:t>
-            </a:r>
-            <a:r>
-              <a:rPr lang="de-CH" dirty="0"/>
-              <a:t>) and </a:t>
-            </a:r>
-            <a:r>
-              <a:rPr lang="de-CH" dirty="0" err="1"/>
-              <a:t>Markdown</a:t>
-            </a:r>
-            <a:r>
-              <a:rPr lang="de-CH" dirty="0"/>
-              <a:t> (</a:t>
-            </a:r>
-            <a:r>
-              <a:rPr lang="de-CH" dirty="0" err="1"/>
-              <a:t>low</a:t>
-            </a:r>
-            <a:r>
-              <a:rPr lang="de-CH" dirty="0"/>
-              <a:t> </a:t>
-            </a:r>
-            <a:r>
-              <a:rPr lang="de-CH" dirty="0" err="1"/>
-              <a:t>priority</a:t>
-            </a:r>
-            <a:r>
-              <a:rPr lang="de-CH" dirty="0"/>
-              <a:t>) supported</a:t>
+              <a:t>HTML (high priority) and Markdown (low priority) supported</a:t>
             </a:r>
           </a:p>
           <a:p>
@@ -3524,7 +3500,7 @@
           <p:cNvPr id="7" name="Inhaltsplatzhalter 6">
             <a:extLst>
               <a:ext uri="{FF2B5EF4-FFF2-40B4-BE49-F238E27FC236}">
-                <a16:creationId xmlns:a16="http://schemas.microsoft.com/office/drawing/2014/main" id="{4EA4BF0B-530F-4AD0-A946-AF5BE1D010D6}"/>
+                <a16:creationId xmlns="" xmlns:a16="http://schemas.microsoft.com/office/drawing/2014/main" id="{4EA4BF0B-530F-4AD0-A946-AF5BE1D010D6}"/>
               </a:ext>
             </a:extLst>
           </p:cNvPr>
@@ -3551,14 +3527,14 @@
                 <a:gridCol w="919494">
                   <a:extLst>
                     <a:ext uri="{9D8B030D-6E8A-4147-A177-3AD203B41FA5}">
-                      <a16:colId xmlns:a16="http://schemas.microsoft.com/office/drawing/2014/main" val="131772496"/>
+                      <a16:colId xmlns="" xmlns:a16="http://schemas.microsoft.com/office/drawing/2014/main" val="131772496"/>
                     </a:ext>
                   </a:extLst>
                 </a:gridCol>
                 <a:gridCol w="3494762">
                   <a:extLst>
                     <a:ext uri="{9D8B030D-6E8A-4147-A177-3AD203B41FA5}">
-                      <a16:colId xmlns:a16="http://schemas.microsoft.com/office/drawing/2014/main" val="1954490935"/>
+                      <a16:colId xmlns="" xmlns:a16="http://schemas.microsoft.com/office/drawing/2014/main" val="1954490935"/>
                     </a:ext>
                   </a:extLst>
                 </a:gridCol>
@@ -3712,7 +3688,7 @@
                 </a:tc>
                 <a:extLst>
                   <a:ext uri="{0D108BD9-81ED-4DB2-BD59-A6C34878D82A}">
-                    <a16:rowId xmlns:a16="http://schemas.microsoft.com/office/drawing/2014/main" val="4126398609"/>
+                    <a16:rowId xmlns="" xmlns:a16="http://schemas.microsoft.com/office/drawing/2014/main" val="4126398609"/>
                   </a:ext>
                 </a:extLst>
               </a:tr>
@@ -3865,7 +3841,7 @@
                 </a:tc>
                 <a:extLst>
                   <a:ext uri="{0D108BD9-81ED-4DB2-BD59-A6C34878D82A}">
-                    <a16:rowId xmlns:a16="http://schemas.microsoft.com/office/drawing/2014/main" val="1152772174"/>
+                    <a16:rowId xmlns="" xmlns:a16="http://schemas.microsoft.com/office/drawing/2014/main" val="1152772174"/>
                   </a:ext>
                 </a:extLst>
               </a:tr>
@@ -4018,7 +3994,7 @@
                 </a:tc>
                 <a:extLst>
                   <a:ext uri="{0D108BD9-81ED-4DB2-BD59-A6C34878D82A}">
-                    <a16:rowId xmlns:a16="http://schemas.microsoft.com/office/drawing/2014/main" val="1274903427"/>
+                    <a16:rowId xmlns="" xmlns:a16="http://schemas.microsoft.com/office/drawing/2014/main" val="1274903427"/>
                   </a:ext>
                 </a:extLst>
               </a:tr>
@@ -4259,7 +4235,7 @@
                 </a:tc>
                 <a:extLst>
                   <a:ext uri="{0D108BD9-81ED-4DB2-BD59-A6C34878D82A}">
-                    <a16:rowId xmlns:a16="http://schemas.microsoft.com/office/drawing/2014/main" val="2276797377"/>
+                    <a16:rowId xmlns="" xmlns:a16="http://schemas.microsoft.com/office/drawing/2014/main" val="2276797377"/>
                   </a:ext>
                 </a:extLst>
               </a:tr>
@@ -4619,7 +4595,7 @@
                 </a:tc>
                 <a:extLst>
                   <a:ext uri="{0D108BD9-81ED-4DB2-BD59-A6C34878D82A}">
-                    <a16:rowId xmlns:a16="http://schemas.microsoft.com/office/drawing/2014/main" val="948287623"/>
+                    <a16:rowId xmlns="" xmlns:a16="http://schemas.microsoft.com/office/drawing/2014/main" val="948287623"/>
                   </a:ext>
                 </a:extLst>
               </a:tr>
@@ -4772,7 +4748,7 @@
                 </a:tc>
                 <a:extLst>
                   <a:ext uri="{0D108BD9-81ED-4DB2-BD59-A6C34878D82A}">
-                    <a16:rowId xmlns:a16="http://schemas.microsoft.com/office/drawing/2014/main" val="3256450425"/>
+                    <a16:rowId xmlns="" xmlns:a16="http://schemas.microsoft.com/office/drawing/2014/main" val="3256450425"/>
                   </a:ext>
                 </a:extLst>
               </a:tr>
@@ -4785,7 +4761,7 @@
           <p:cNvPr id="6" name="Textfeld 5">
             <a:extLst>
               <a:ext uri="{FF2B5EF4-FFF2-40B4-BE49-F238E27FC236}">
-                <a16:creationId xmlns:a16="http://schemas.microsoft.com/office/drawing/2014/main" id="{328A8D09-03D4-42D2-878D-015A70874F30}"/>
+                <a16:creationId xmlns="" xmlns:a16="http://schemas.microsoft.com/office/drawing/2014/main" id="{328A8D09-03D4-42D2-878D-015A70874F30}"/>
               </a:ext>
             </a:extLst>
           </p:cNvPr>
@@ -4845,7 +4821,7 @@
           <p:cNvPr id="2" name="Titel 1">
             <a:extLst>
               <a:ext uri="{FF2B5EF4-FFF2-40B4-BE49-F238E27FC236}">
-                <a16:creationId xmlns:a16="http://schemas.microsoft.com/office/drawing/2014/main" id="{C983BEE3-920D-427E-8C29-BEE107D60E7B}"/>
+                <a16:creationId xmlns="" xmlns:a16="http://schemas.microsoft.com/office/drawing/2014/main" id="{C983BEE3-920D-427E-8C29-BEE107D60E7B}"/>
               </a:ext>
             </a:extLst>
           </p:cNvPr>
@@ -4882,7 +4858,7 @@
           <p:cNvPr id="3" name="Inhaltsplatzhalter 2">
             <a:extLst>
               <a:ext uri="{FF2B5EF4-FFF2-40B4-BE49-F238E27FC236}">
-                <a16:creationId xmlns:a16="http://schemas.microsoft.com/office/drawing/2014/main" id="{159C9F8F-1A1D-4743-9F98-FA4A4B2AE5DC}"/>
+                <a16:creationId xmlns="" xmlns:a16="http://schemas.microsoft.com/office/drawing/2014/main" id="{159C9F8F-1A1D-4743-9F98-FA4A4B2AE5DC}"/>
               </a:ext>
             </a:extLst>
           </p:cNvPr>
@@ -5000,34 +4976,12 @@
             </a:pPr>
             <a:r>
               <a:rPr lang="de-CH" dirty="0"/>
-              <a:t>Inline Text Styling (Color, Size, </a:t>
-            </a:r>
-            <a:r>
-              <a:rPr lang="de-CH" dirty="0" err="1"/>
-              <a:t>Weight</a:t>
-            </a:r>
-            <a:r>
-              <a:rPr lang="de-CH" dirty="0"/>
-              <a:t>) </a:t>
-            </a:r>
-            <a:r>
-              <a:rPr lang="de-CH" dirty="0" err="1"/>
-              <a:t>is</a:t>
-            </a:r>
-            <a:r>
-              <a:rPr lang="de-CH" dirty="0"/>
-              <a:t> </a:t>
-            </a:r>
-            <a:r>
-              <a:rPr lang="de-CH" dirty="0" err="1"/>
-              <a:t>available</a:t>
-            </a:r>
-            <a:endParaRPr lang="de-CH" dirty="0"/>
-          </a:p>
-          <a:p>
-            <a:pPr marL="0" indent="0">
-              <a:buNone/>
-            </a:pPr>
+              <a:t>User-specified tags are </a:t>
+            </a:r>
+            <a:r>
+              <a:rPr lang="de-CH" dirty="0" smtClean="0"/>
+              <a:t>allowed</a:t>
+            </a:r>
             <a:endParaRPr lang="de-CH" dirty="0"/>
           </a:p>
           <a:p>
@@ -5035,36 +4989,6 @@
               <a:buFont typeface="Wingdings" panose="05000000000000000000" pitchFamily="2" charset="2"/>
               <a:buChar char="§"/>
             </a:pPr>
-            <a:r>
-              <a:rPr lang="de-CH" dirty="0"/>
-              <a:t>User-</a:t>
-            </a:r>
-            <a:r>
-              <a:rPr lang="de-CH" dirty="0" err="1"/>
-              <a:t>specified</a:t>
-            </a:r>
-            <a:r>
-              <a:rPr lang="de-CH" dirty="0"/>
-              <a:t> tags </a:t>
-            </a:r>
-            <a:r>
-              <a:rPr lang="de-CH" dirty="0" err="1"/>
-              <a:t>are</a:t>
-            </a:r>
-            <a:r>
-              <a:rPr lang="de-CH" dirty="0"/>
-              <a:t> </a:t>
-            </a:r>
-            <a:r>
-              <a:rPr lang="de-CH" dirty="0" err="1"/>
-              <a:t>allowed</a:t>
-            </a:r>
-            <a:endParaRPr lang="de-CH" dirty="0"/>
-          </a:p>
-          <a:p>
-            <a:pPr marL="0" indent="0">
-              <a:buNone/>
-            </a:pPr>
             <a:endParaRPr lang="de-CH" dirty="0"/>
           </a:p>
           <a:p>
@@ -5073,37 +4997,45 @@
               <a:buChar char="§"/>
             </a:pPr>
             <a:r>
-              <a:rPr lang="de-CH" dirty="0" err="1"/>
-              <a:t>Minification</a:t>
+              <a:rPr lang="de-CH" dirty="0" smtClean="0"/>
+              <a:t>Minification </a:t>
             </a:r>
             <a:r>
               <a:rPr lang="de-CH" dirty="0"/>
-              <a:t> and </a:t>
-            </a:r>
-            <a:r>
-              <a:rPr lang="de-CH" dirty="0" err="1"/>
-              <a:t>correction</a:t>
+              <a:t>and correction of wrong tags </a:t>
             </a:r>
             <a:r>
               <a:rPr lang="de-CH" dirty="0"/>
-              <a:t> </a:t>
-            </a:r>
-            <a:r>
-              <a:rPr lang="de-CH" dirty="0" err="1"/>
-              <a:t>of</a:t>
+              <a:t>supported</a:t>
+            </a:r>
+          </a:p>
+          <a:p>
+            <a:pPr>
+              <a:buFont typeface="Wingdings" panose="05000000000000000000" pitchFamily="2" charset="2"/>
+              <a:buChar char="§"/>
+            </a:pPr>
+            <a:endParaRPr lang="de-CH" smtClean="0"/>
+          </a:p>
+          <a:p>
+            <a:pPr>
+              <a:buFont typeface="Wingdings" panose="05000000000000000000" pitchFamily="2" charset="2"/>
+              <a:buChar char="§"/>
+            </a:pPr>
+            <a:r>
+              <a:rPr lang="de-CH" smtClean="0"/>
+              <a:t>Inline </a:t>
             </a:r>
             <a:r>
               <a:rPr lang="de-CH" dirty="0"/>
-              <a:t> </a:t>
-            </a:r>
-            <a:r>
-              <a:rPr lang="de-CH" dirty="0" err="1"/>
-              <a:t>wrong</a:t>
-            </a:r>
-            <a:r>
-              <a:rPr lang="de-CH" dirty="0"/>
-              <a:t> tags supported</a:t>
-            </a:r>
+              <a:t>Text Styling (Color, Size, Weight) is available</a:t>
+            </a:r>
+          </a:p>
+          <a:p>
+            <a:pPr>
+              <a:buFont typeface="Wingdings" panose="05000000000000000000" pitchFamily="2" charset="2"/>
+              <a:buChar char="§"/>
+            </a:pPr>
+            <a:endParaRPr lang="de-CH" dirty="0"/>
           </a:p>
         </p:txBody>
       </p:sp>
@@ -5112,7 +5044,7 @@
           <p:cNvPr id="4" name="Datumsplatzhalter 3">
             <a:extLst>
               <a:ext uri="{FF2B5EF4-FFF2-40B4-BE49-F238E27FC236}">
-                <a16:creationId xmlns:a16="http://schemas.microsoft.com/office/drawing/2014/main" id="{908158A3-5747-4E50-91FB-1375BFE51249}"/>
+                <a16:creationId xmlns="" xmlns:a16="http://schemas.microsoft.com/office/drawing/2014/main" id="{908158A3-5747-4E50-91FB-1375BFE51249}"/>
               </a:ext>
             </a:extLst>
           </p:cNvPr>
@@ -5141,7 +5073,7 @@
           <p:cNvPr id="6" name="Foliennummernplatzhalter 5">
             <a:extLst>
               <a:ext uri="{FF2B5EF4-FFF2-40B4-BE49-F238E27FC236}">
-                <a16:creationId xmlns:a16="http://schemas.microsoft.com/office/drawing/2014/main" id="{910A8E3D-E5E6-450B-B342-3CD6C35F8E80}"/>
+                <a16:creationId xmlns="" xmlns:a16="http://schemas.microsoft.com/office/drawing/2014/main" id="{910A8E3D-E5E6-450B-B342-3CD6C35F8E80}"/>
               </a:ext>
             </a:extLst>
           </p:cNvPr>
@@ -5205,7 +5137,7 @@
           <p:cNvPr id="2" name="Titel 1">
             <a:extLst>
               <a:ext uri="{FF2B5EF4-FFF2-40B4-BE49-F238E27FC236}">
-                <a16:creationId xmlns:a16="http://schemas.microsoft.com/office/drawing/2014/main" id="{C983BEE3-920D-427E-8C29-BEE107D60E7B}"/>
+                <a16:creationId xmlns="" xmlns:a16="http://schemas.microsoft.com/office/drawing/2014/main" id="{C983BEE3-920D-427E-8C29-BEE107D60E7B}"/>
               </a:ext>
             </a:extLst>
           </p:cNvPr>
@@ -5246,7 +5178,7 @@
           <p:cNvPr id="3" name="Inhaltsplatzhalter 2">
             <a:extLst>
               <a:ext uri="{FF2B5EF4-FFF2-40B4-BE49-F238E27FC236}">
-                <a16:creationId xmlns:a16="http://schemas.microsoft.com/office/drawing/2014/main" id="{159C9F8F-1A1D-4743-9F98-FA4A4B2AE5DC}"/>
+                <a16:creationId xmlns="" xmlns:a16="http://schemas.microsoft.com/office/drawing/2014/main" id="{159C9F8F-1A1D-4743-9F98-FA4A4B2AE5DC}"/>
               </a:ext>
             </a:extLst>
           </p:cNvPr>
@@ -5317,8 +5249,12 @@
               <a:buChar char="§"/>
             </a:pPr>
             <a:r>
+              <a:rPr lang="en-US" dirty="0" smtClean="0"/>
+              <a:t>Easily </a:t>
+            </a:r>
+            <a:r>
               <a:rPr lang="en-US" dirty="0"/>
-              <a:t>Easy extendable</a:t>
+              <a:t>extendable</a:t>
             </a:r>
           </a:p>
           <a:p>
@@ -5342,7 +5278,7 @@
           <p:cNvPr id="4" name="Datumsplatzhalter 3">
             <a:extLst>
               <a:ext uri="{FF2B5EF4-FFF2-40B4-BE49-F238E27FC236}">
-                <a16:creationId xmlns:a16="http://schemas.microsoft.com/office/drawing/2014/main" id="{908158A3-5747-4E50-91FB-1375BFE51249}"/>
+                <a16:creationId xmlns="" xmlns:a16="http://schemas.microsoft.com/office/drawing/2014/main" id="{908158A3-5747-4E50-91FB-1375BFE51249}"/>
               </a:ext>
             </a:extLst>
           </p:cNvPr>
@@ -5371,7 +5307,7 @@
           <p:cNvPr id="6" name="Foliennummernplatzhalter 5">
             <a:extLst>
               <a:ext uri="{FF2B5EF4-FFF2-40B4-BE49-F238E27FC236}">
-                <a16:creationId xmlns:a16="http://schemas.microsoft.com/office/drawing/2014/main" id="{910A8E3D-E5E6-450B-B342-3CD6C35F8E80}"/>
+                <a16:creationId xmlns="" xmlns:a16="http://schemas.microsoft.com/office/drawing/2014/main" id="{910A8E3D-E5E6-450B-B342-3CD6C35F8E80}"/>
               </a:ext>
             </a:extLst>
           </p:cNvPr>
@@ -5435,7 +5371,7 @@
           <p:cNvPr id="2" name="Titel 1">
             <a:extLst>
               <a:ext uri="{FF2B5EF4-FFF2-40B4-BE49-F238E27FC236}">
-                <a16:creationId xmlns:a16="http://schemas.microsoft.com/office/drawing/2014/main" id="{39B89E43-C881-4EE6-8E75-107058079DDB}"/>
+                <a16:creationId xmlns="" xmlns:a16="http://schemas.microsoft.com/office/drawing/2014/main" id="{39B89E43-C881-4EE6-8E75-107058079DDB}"/>
               </a:ext>
             </a:extLst>
           </p:cNvPr>
@@ -5464,7 +5400,7 @@
           <p:cNvPr id="3" name="Inhaltsplatzhalter 2">
             <a:extLst>
               <a:ext uri="{FF2B5EF4-FFF2-40B4-BE49-F238E27FC236}">
-                <a16:creationId xmlns:a16="http://schemas.microsoft.com/office/drawing/2014/main" id="{5352EB88-15D1-4491-8FE2-04CBF959A96B}"/>
+                <a16:creationId xmlns="" xmlns:a16="http://schemas.microsoft.com/office/drawing/2014/main" id="{5352EB88-15D1-4491-8FE2-04CBF959A96B}"/>
               </a:ext>
             </a:extLst>
           </p:cNvPr>
@@ -5546,7 +5482,7 @@
           <p:cNvPr id="4" name="Datumsplatzhalter 3">
             <a:extLst>
               <a:ext uri="{FF2B5EF4-FFF2-40B4-BE49-F238E27FC236}">
-                <a16:creationId xmlns:a16="http://schemas.microsoft.com/office/drawing/2014/main" id="{59E4A9F8-8387-41DD-BDA8-961C9D8217FD}"/>
+                <a16:creationId xmlns="" xmlns:a16="http://schemas.microsoft.com/office/drawing/2014/main" id="{59E4A9F8-8387-41DD-BDA8-961C9D8217FD}"/>
               </a:ext>
             </a:extLst>
           </p:cNvPr>
@@ -5575,7 +5511,7 @@
           <p:cNvPr id="6" name="Foliennummernplatzhalter 5">
             <a:extLst>
               <a:ext uri="{FF2B5EF4-FFF2-40B4-BE49-F238E27FC236}">
-                <a16:creationId xmlns:a16="http://schemas.microsoft.com/office/drawing/2014/main" id="{53D2FE0A-E138-483E-9921-F8980503EB7D}"/>
+                <a16:creationId xmlns="" xmlns:a16="http://schemas.microsoft.com/office/drawing/2014/main" id="{53D2FE0A-E138-483E-9921-F8980503EB7D}"/>
               </a:ext>
             </a:extLst>
           </p:cNvPr>
@@ -5639,7 +5575,7 @@
           <p:cNvPr id="2" name="Titel 1">
             <a:extLst>
               <a:ext uri="{FF2B5EF4-FFF2-40B4-BE49-F238E27FC236}">
-                <a16:creationId xmlns:a16="http://schemas.microsoft.com/office/drawing/2014/main" id="{CE3E1D48-114E-4805-98BA-35BECA1E1B51}"/>
+                <a16:creationId xmlns="" xmlns:a16="http://schemas.microsoft.com/office/drawing/2014/main" id="{CE3E1D48-114E-4805-98BA-35BECA1E1B51}"/>
               </a:ext>
             </a:extLst>
           </p:cNvPr>
@@ -5668,7 +5604,7 @@
           <p:cNvPr id="3" name="Inhaltsplatzhalter 2">
             <a:extLst>
               <a:ext uri="{FF2B5EF4-FFF2-40B4-BE49-F238E27FC236}">
-                <a16:creationId xmlns:a16="http://schemas.microsoft.com/office/drawing/2014/main" id="{4A7C7B52-2589-47F6-8D50-CB5280763176}"/>
+                <a16:creationId xmlns="" xmlns:a16="http://schemas.microsoft.com/office/drawing/2014/main" id="{4A7C7B52-2589-47F6-8D50-CB5280763176}"/>
               </a:ext>
             </a:extLst>
           </p:cNvPr>
@@ -5689,50 +5625,13 @@
               <a:buChar char="§"/>
             </a:pPr>
             <a:r>
-              <a:rPr lang="de-CH" dirty="0" err="1"/>
-              <a:t>Less</a:t>
+              <a:rPr lang="de-CH" dirty="0" smtClean="0"/>
+              <a:t>Fewer errors in submission </a:t>
             </a:r>
             <a:r>
               <a:rPr lang="de-CH" dirty="0"/>
-              <a:t> </a:t>
-            </a:r>
-            <a:r>
-              <a:rPr lang="de-CH" dirty="0" err="1"/>
-              <a:t>errors</a:t>
-            </a:r>
-            <a:r>
-              <a:rPr lang="de-CH" dirty="0"/>
-              <a:t> </a:t>
-            </a:r>
-            <a:r>
-              <a:rPr lang="de-CH" dirty="0" err="1"/>
-              <a:t>by</a:t>
-            </a:r>
-            <a:r>
-              <a:rPr lang="de-CH" dirty="0"/>
-              <a:t> </a:t>
-            </a:r>
-            <a:r>
-              <a:rPr lang="de-CH" dirty="0" err="1"/>
-              <a:t>better</a:t>
-            </a:r>
-            <a:r>
-              <a:rPr lang="de-CH" dirty="0"/>
-              <a:t> and </a:t>
-            </a:r>
-            <a:r>
-              <a:rPr lang="de-CH" dirty="0" err="1"/>
-              <a:t>earlier</a:t>
-            </a:r>
-            <a:r>
-              <a:rPr lang="de-CH" dirty="0"/>
-              <a:t> </a:t>
-            </a:r>
-            <a:r>
-              <a:rPr lang="de-CH" dirty="0" err="1"/>
-              <a:t>revision</a:t>
-            </a:r>
-            <a:endParaRPr lang="de-CH" dirty="0"/>
+              <a:t>by better and earlier revision</a:t>
+            </a:r>
           </a:p>
           <a:p>
             <a:pPr>
@@ -5813,7 +5712,7 @@
           <p:cNvPr id="4" name="Datumsplatzhalter 3">
             <a:extLst>
               <a:ext uri="{FF2B5EF4-FFF2-40B4-BE49-F238E27FC236}">
-                <a16:creationId xmlns:a16="http://schemas.microsoft.com/office/drawing/2014/main" id="{6594126E-4C6B-4F9B-B377-2D5B7F5CC90D}"/>
+                <a16:creationId xmlns="" xmlns:a16="http://schemas.microsoft.com/office/drawing/2014/main" id="{6594126E-4C6B-4F9B-B377-2D5B7F5CC90D}"/>
               </a:ext>
             </a:extLst>
           </p:cNvPr>
@@ -5842,7 +5741,7 @@
           <p:cNvPr id="6" name="Foliennummernplatzhalter 5">
             <a:extLst>
               <a:ext uri="{FF2B5EF4-FFF2-40B4-BE49-F238E27FC236}">
-                <a16:creationId xmlns:a16="http://schemas.microsoft.com/office/drawing/2014/main" id="{AE709DCA-0E66-4D55-A559-4BCDC5AF3387}"/>
+                <a16:creationId xmlns="" xmlns:a16="http://schemas.microsoft.com/office/drawing/2014/main" id="{AE709DCA-0E66-4D55-A559-4BCDC5AF3387}"/>
               </a:ext>
             </a:extLst>
           </p:cNvPr>
@@ -5876,7 +5775,7 @@
           <p:cNvPr id="9" name="Tabelle 8">
             <a:extLst>
               <a:ext uri="{FF2B5EF4-FFF2-40B4-BE49-F238E27FC236}">
-                <a16:creationId xmlns:a16="http://schemas.microsoft.com/office/drawing/2014/main" id="{4534783A-1240-4CD6-AC96-8599DEC86C3B}"/>
+                <a16:creationId xmlns="" xmlns:a16="http://schemas.microsoft.com/office/drawing/2014/main" id="{4534783A-1240-4CD6-AC96-8599DEC86C3B}"/>
               </a:ext>
             </a:extLst>
           </p:cNvPr>
@@ -5893,7 +5792,7 @@
         </p:nvGraphicFramePr>
         <p:xfrm>
           <a:off x="5622290" y="2849550"/>
-          <a:ext cx="5658485" cy="1456182"/>
+          <a:ext cx="5658485" cy="1542288"/>
         </p:xfrm>
         <a:graphic>
           <a:graphicData uri="http://schemas.openxmlformats.org/drawingml/2006/table">
@@ -5903,14 +5802,14 @@
                 <a:gridCol w="1188720">
                   <a:extLst>
                     <a:ext uri="{9D8B030D-6E8A-4147-A177-3AD203B41FA5}">
-                      <a16:colId xmlns:a16="http://schemas.microsoft.com/office/drawing/2014/main" val="3203041878"/>
+                      <a16:colId xmlns="" xmlns:a16="http://schemas.microsoft.com/office/drawing/2014/main" val="3203041878"/>
                     </a:ext>
                   </a:extLst>
                 </a:gridCol>
                 <a:gridCol w="4469765">
                   <a:extLst>
                     <a:ext uri="{9D8B030D-6E8A-4147-A177-3AD203B41FA5}">
-                      <a16:colId xmlns:a16="http://schemas.microsoft.com/office/drawing/2014/main" val="952541040"/>
+                      <a16:colId xmlns="" xmlns:a16="http://schemas.microsoft.com/office/drawing/2014/main" val="952541040"/>
                     </a:ext>
                   </a:extLst>
                 </a:gridCol>
@@ -6064,7 +5963,7 @@
                 </a:tc>
                 <a:extLst>
                   <a:ext uri="{0D108BD9-81ED-4DB2-BD59-A6C34878D82A}">
-                    <a16:rowId xmlns:a16="http://schemas.microsoft.com/office/drawing/2014/main" val="1569925821"/>
+                    <a16:rowId xmlns="" xmlns:a16="http://schemas.microsoft.com/office/drawing/2014/main" val="1569925821"/>
                   </a:ext>
                 </a:extLst>
               </a:tr>
@@ -6217,7 +6116,7 @@
                 </a:tc>
                 <a:extLst>
                   <a:ext uri="{0D108BD9-81ED-4DB2-BD59-A6C34878D82A}">
-                    <a16:rowId xmlns:a16="http://schemas.microsoft.com/office/drawing/2014/main" val="3526574001"/>
+                    <a16:rowId xmlns="" xmlns:a16="http://schemas.microsoft.com/office/drawing/2014/main" val="3526574001"/>
                   </a:ext>
                 </a:extLst>
               </a:tr>
@@ -6370,7 +6269,7 @@
                 </a:tc>
                 <a:extLst>
                   <a:ext uri="{0D108BD9-81ED-4DB2-BD59-A6C34878D82A}">
-                    <a16:rowId xmlns:a16="http://schemas.microsoft.com/office/drawing/2014/main" val="2032610195"/>
+                    <a16:rowId xmlns="" xmlns:a16="http://schemas.microsoft.com/office/drawing/2014/main" val="2032610195"/>
                   </a:ext>
                 </a:extLst>
               </a:tr>
@@ -6523,7 +6422,7 @@
                 </a:tc>
                 <a:extLst>
                   <a:ext uri="{0D108BD9-81ED-4DB2-BD59-A6C34878D82A}">
-                    <a16:rowId xmlns:a16="http://schemas.microsoft.com/office/drawing/2014/main" val="4258045347"/>
+                    <a16:rowId xmlns="" xmlns:a16="http://schemas.microsoft.com/office/drawing/2014/main" val="4258045347"/>
                   </a:ext>
                 </a:extLst>
               </a:tr>
@@ -6676,7 +6575,7 @@
                 </a:tc>
                 <a:extLst>
                   <a:ext uri="{0D108BD9-81ED-4DB2-BD59-A6C34878D82A}">
-                    <a16:rowId xmlns:a16="http://schemas.microsoft.com/office/drawing/2014/main" val="946167001"/>
+                    <a16:rowId xmlns="" xmlns:a16="http://schemas.microsoft.com/office/drawing/2014/main" val="946167001"/>
                   </a:ext>
                 </a:extLst>
               </a:tr>
@@ -6829,7 +6728,7 @@
                 </a:tc>
                 <a:extLst>
                   <a:ext uri="{0D108BD9-81ED-4DB2-BD59-A6C34878D82A}">
-                    <a16:rowId xmlns:a16="http://schemas.microsoft.com/office/drawing/2014/main" val="1800317223"/>
+                    <a16:rowId xmlns="" xmlns:a16="http://schemas.microsoft.com/office/drawing/2014/main" val="1800317223"/>
                   </a:ext>
                 </a:extLst>
               </a:tr>
@@ -6842,7 +6741,7 @@
           <p:cNvPr id="10" name="Ellipse 9">
             <a:extLst>
               <a:ext uri="{FF2B5EF4-FFF2-40B4-BE49-F238E27FC236}">
-                <a16:creationId xmlns:a16="http://schemas.microsoft.com/office/drawing/2014/main" id="{E6EC7530-FDD2-43CC-8D10-EC41A0A6DC08}"/>
+                <a16:creationId xmlns="" xmlns:a16="http://schemas.microsoft.com/office/drawing/2014/main" id="{E6EC7530-FDD2-43CC-8D10-EC41A0A6DC08}"/>
               </a:ext>
             </a:extLst>
           </p:cNvPr>
@@ -6871,8 +6770,8 @@
           </a:ln>
           <a:effectLst/>
           <a:extLst>
-            <a:ext uri="{AF507438-7753-43e0-B8FC-AC1667EBCBE1}">
-              <a14:hiddenEffects xmlns="" xmlns:a14="http://schemas.microsoft.com/office/drawing/2010/main">
+            <a:ext uri="{AF507438-7753-43E0-B8FC-AC1667EBCBE1}">
+              <a14:hiddenEffects xmlns:a14="http://schemas.microsoft.com/office/drawing/2010/main">
                 <a:effectLst>
                   <a:outerShdw blurRad="63500" dist="35921" dir="2700000" algn="ctr" rotWithShape="0">
                     <a:schemeClr val="bg2"/>
@@ -6926,7 +6825,7 @@
           <p:cNvPr id="12" name="Gerader Verbinder 11">
             <a:extLst>
               <a:ext uri="{FF2B5EF4-FFF2-40B4-BE49-F238E27FC236}">
-                <a16:creationId xmlns:a16="http://schemas.microsoft.com/office/drawing/2014/main" id="{F059FFA8-EC73-4D4D-8E7E-BA96FD82C8AE}"/>
+                <a16:creationId xmlns="" xmlns:a16="http://schemas.microsoft.com/office/drawing/2014/main" id="{F059FFA8-EC73-4D4D-8E7E-BA96FD82C8AE}"/>
               </a:ext>
             </a:extLst>
           </p:cNvPr>
@@ -6946,8 +6845,8 @@
             <a:tailEnd type="none" w="med" len="med"/>
           </a:ln>
           <a:extLst>
-            <a:ext uri="{AF507438-7753-43e0-B8FC-AC1667EBCBE1}">
-              <a14:hiddenEffects xmlns="" xmlns:a14="http://schemas.microsoft.com/office/drawing/2010/main">
+            <a:ext uri="{AF507438-7753-43E0-B8FC-AC1667EBCBE1}">
+              <a14:hiddenEffects xmlns:a14="http://schemas.microsoft.com/office/drawing/2010/main">
                 <a:effectLst>
                   <a:outerShdw blurRad="63500" dist="35921" dir="2700000" algn="ctr" rotWithShape="0">
                     <a:schemeClr val="bg2"/>
@@ -6977,7 +6876,7 @@
           <p:cNvPr id="13" name="Textfeld 12">
             <a:extLst>
               <a:ext uri="{FF2B5EF4-FFF2-40B4-BE49-F238E27FC236}">
-                <a16:creationId xmlns:a16="http://schemas.microsoft.com/office/drawing/2014/main" id="{267DE0B2-4822-4A8D-8641-9C4C5E291590}"/>
+                <a16:creationId xmlns="" xmlns:a16="http://schemas.microsoft.com/office/drawing/2014/main" id="{267DE0B2-4822-4A8D-8641-9C4C5E291590}"/>
               </a:ext>
             </a:extLst>
           </p:cNvPr>
@@ -7251,8 +7150,8 @@
         </a:ln>
         <a:effectLst/>
         <a:extLst>
-          <a:ext uri="{AF507438-7753-43e0-B8FC-AC1667EBCBE1}">
-            <a14:hiddenEffects xmlns="" xmlns:a14="http://schemas.microsoft.com/office/drawing/2010/main">
+          <a:ext uri="{AF507438-7753-43E0-B8FC-AC1667EBCBE1}">
+            <a14:hiddenEffects xmlns:a14="http://schemas.microsoft.com/office/drawing/2010/main">
               <a:effectLst>
                 <a:outerShdw blurRad="63500" dist="35921" dir="2700000" algn="ctr" rotWithShape="0">
                   <a:schemeClr val="bg2"/>
@@ -7326,8 +7225,8 @@
         </a:ln>
         <a:effectLst/>
         <a:extLst>
-          <a:ext uri="{AF507438-7753-43e0-B8FC-AC1667EBCBE1}">
-            <a14:hiddenEffects xmlns="" xmlns:a14="http://schemas.microsoft.com/office/drawing/2010/main">
+          <a:ext uri="{AF507438-7753-43E0-B8FC-AC1667EBCBE1}">
+            <a14:hiddenEffects xmlns:a14="http://schemas.microsoft.com/office/drawing/2010/main">
               <a:effectLst>
                 <a:outerShdw blurRad="63500" dist="35921" dir="2700000" algn="ctr" rotWithShape="0">
                   <a:schemeClr val="bg2"/>
@@ -7571,7 +7470,7 @@
   </a:custClrLst>
   <a:extLst>
     <a:ext uri="{05A4C25C-085E-4340-85A3-A5531E510DB2}">
-      <thm15:themeFamily xmlns:thm15="http://schemas.microsoft.com/office/thememl/2012/main" name="uzh_praesentation_e.potx" id="{749176B2-8F2A-4342-A048-60BED46E758F}" vid="{432F7B11-0F4C-4FE0-A45B-1D1A5AE252E3}"/>
+      <thm15:themeFamily xmlns="" xmlns:thm15="http://schemas.microsoft.com/office/thememl/2012/main" name="uzh_praesentation_e.potx" id="{749176B2-8F2A-4342-A048-60BED46E758F}" vid="{432F7B11-0F4C-4FE0-A45B-1D1A5AE252E3}"/>
     </a:ext>
   </a:extLst>
 </a:theme>

</xml_diff>